<commit_message>
ISS-11: Fix incorrect slide number parsed
</commit_message>
<xml_diff>
--- a/test/PptxXML.Tests/Resource/009.pptx
+++ b/test/PptxXML.Tests/Resource/009.pptx
@@ -6,6 +6,7 @@
   </p:sldMasterIdLst>
   <p:sldIdLst>
     <p:sldId id="256" r:id="rId2"/>
+    <p:sldId id="257" r:id="rId3"/>
   </p:sldIdLst>
   <p:sldSz cx="9144000" cy="5143500" type="screen16x9"/>
   <p:notesSz cx="7772400" cy="10058400"/>
@@ -115,7 +116,7 @@
 <file path=ppt/charts/chart1.xml><?xml version="1.0" encoding="utf-8"?>
 <c:chartSpace xmlns:c="http://schemas.openxmlformats.org/drawingml/2006/chart" xmlns:a="http://schemas.openxmlformats.org/drawingml/2006/main" xmlns:r="http://schemas.openxmlformats.org/officeDocument/2006/relationships" xmlns:c16r2="http://schemas.microsoft.com/office/drawing/2015/06/chart">
   <c:date1904 val="0"/>
-  <c:lang val="en-US"/>
+  <c:lang val="ru-RU"/>
   <c:roundedCorners val="0"/>
   <mc:AlternateContent xmlns:mc="http://schemas.openxmlformats.org/markup-compatibility/2006">
     <mc:Choice xmlns:c14="http://schemas.microsoft.com/office/drawing/2007/8/2/chart" Requires="c14">
@@ -152,7 +153,7 @@
               <a:cs typeface="+mn-cs"/>
             </a:defRPr>
           </a:pPr>
-          <a:endParaRPr lang="en-US"/>
+          <a:endParaRPr lang="ru-UA"/>
         </a:p>
       </c:txPr>
     </c:title>
@@ -430,7 +431,7 @@
                 <a:cs typeface="+mn-cs"/>
               </a:defRPr>
             </a:pPr>
-            <a:endParaRPr lang="en-US"/>
+            <a:endParaRPr lang="ru-UA"/>
           </a:p>
         </c:txPr>
         <c:crossAx val="947864576"/>
@@ -489,7 +490,7 @@
                 <a:cs typeface="+mn-cs"/>
               </a:defRPr>
             </a:pPr>
-            <a:endParaRPr lang="en-US"/>
+            <a:endParaRPr lang="ru-UA"/>
           </a:p>
         </c:txPr>
         <c:crossAx val="947800784"/>
@@ -531,7 +532,7 @@
               <a:cs typeface="+mn-cs"/>
             </a:defRPr>
           </a:pPr>
-          <a:endParaRPr lang="en-US"/>
+          <a:endParaRPr lang="ru-UA"/>
         </a:p>
       </c:txPr>
     </c:legend>
@@ -560,7 +561,7 @@
       <a:pPr>
         <a:defRPr/>
       </a:pPr>
-      <a:endParaRPr lang="en-US"/>
+      <a:endParaRPr lang="ru-UA"/>
     </a:p>
   </c:txPr>
   <c:externalData r:id="rId3">
@@ -3576,6 +3577,207 @@
 </p:sld>
 </file>
 
+<file path=ppt/slides/slide2.xml><?xml version="1.0" encoding="utf-8"?>
+<p:sld xmlns:a="http://schemas.openxmlformats.org/drawingml/2006/main" xmlns:r="http://schemas.openxmlformats.org/officeDocument/2006/relationships" xmlns:p="http://schemas.openxmlformats.org/presentationml/2006/main">
+  <p:cSld>
+    <p:spTree>
+      <p:nvGrpSpPr>
+        <p:cNvPr id="1" name=""/>
+        <p:cNvGrpSpPr/>
+        <p:nvPr/>
+      </p:nvGrpSpPr>
+      <p:grpSpPr>
+        <a:xfrm>
+          <a:off x="0" y="0"/>
+          <a:ext cx="0" cy="0"/>
+          <a:chOff x="0" y="0"/>
+          <a:chExt cx="0" cy="0"/>
+        </a:xfrm>
+      </p:grpSpPr>
+      <p:grpSp>
+        <p:nvGrpSpPr>
+          <p:cNvPr id="7" name="Группа 6">
+            <a:extLst>
+              <a:ext uri="{FF2B5EF4-FFF2-40B4-BE49-F238E27FC236}">
+                <a16:creationId xmlns:a16="http://schemas.microsoft.com/office/drawing/2014/main" id="{992097A3-9F6C-4062-8D54-7D9E77452DA3}"/>
+              </a:ext>
+            </a:extLst>
+          </p:cNvPr>
+          <p:cNvGrpSpPr/>
+          <p:nvPr/>
+        </p:nvGrpSpPr>
+        <p:grpSpPr>
+          <a:xfrm>
+            <a:off x="507259" y="1214749"/>
+            <a:ext cx="2255965" cy="1477140"/>
+            <a:chOff x="1868847" y="1421658"/>
+            <a:chExt cx="2255965" cy="1477140"/>
+          </a:xfrm>
+        </p:grpSpPr>
+        <p:sp>
+          <p:nvSpPr>
+            <p:cNvPr id="4" name="Прямоугольник 3">
+              <a:extLst>
+                <a:ext uri="{FF2B5EF4-FFF2-40B4-BE49-F238E27FC236}">
+                  <a16:creationId xmlns:a16="http://schemas.microsoft.com/office/drawing/2014/main" id="{D08A26D5-2766-499F-B702-9BE796F6A225}"/>
+                </a:ext>
+              </a:extLst>
+            </p:cNvPr>
+            <p:cNvSpPr/>
+            <p:nvPr/>
+          </p:nvSpPr>
+          <p:spPr>
+            <a:xfrm>
+              <a:off x="1868847" y="1421658"/>
+              <a:ext cx="2255965" cy="654096"/>
+            </a:xfrm>
+            <a:prstGeom prst="rect">
+              <a:avLst/>
+            </a:prstGeom>
+          </p:spPr>
+          <p:style>
+            <a:lnRef idx="2">
+              <a:schemeClr val="accent1">
+                <a:shade val="50000"/>
+              </a:schemeClr>
+            </a:lnRef>
+            <a:fillRef idx="1">
+              <a:schemeClr val="accent1"/>
+            </a:fillRef>
+            <a:effectRef idx="0">
+              <a:schemeClr val="accent1"/>
+            </a:effectRef>
+            <a:fontRef idx="minor">
+              <a:schemeClr val="lt1"/>
+            </a:fontRef>
+          </p:style>
+          <p:txBody>
+            <a:bodyPr rtlCol="0" anchor="ctr"/>
+            <a:lstStyle/>
+            <a:p>
+              <a:pPr algn="ctr"/>
+              <a:r>
+                <a:rPr lang="en-US" dirty="0"/>
+                <a:t>el2</a:t>
+              </a:r>
+              <a:endParaRPr lang="ru-UA" dirty="0"/>
+            </a:p>
+          </p:txBody>
+        </p:sp>
+        <p:sp>
+          <p:nvSpPr>
+            <p:cNvPr id="5" name="Прямоугольник 4">
+              <a:extLst>
+                <a:ext uri="{FF2B5EF4-FFF2-40B4-BE49-F238E27FC236}">
+                  <a16:creationId xmlns:a16="http://schemas.microsoft.com/office/drawing/2014/main" id="{A91C6241-D598-4D23-9BCD-2BB2F7A0D906}"/>
+                </a:ext>
+              </a:extLst>
+            </p:cNvPr>
+            <p:cNvSpPr/>
+            <p:nvPr/>
+          </p:nvSpPr>
+          <p:spPr>
+            <a:xfrm>
+              <a:off x="2943434" y="2244702"/>
+              <a:ext cx="1181377" cy="654096"/>
+            </a:xfrm>
+            <a:prstGeom prst="rect">
+              <a:avLst/>
+            </a:prstGeom>
+          </p:spPr>
+          <p:style>
+            <a:lnRef idx="2">
+              <a:schemeClr val="accent1">
+                <a:shade val="50000"/>
+              </a:schemeClr>
+            </a:lnRef>
+            <a:fillRef idx="1">
+              <a:schemeClr val="accent1"/>
+            </a:fillRef>
+            <a:effectRef idx="0">
+              <a:schemeClr val="accent1"/>
+            </a:effectRef>
+            <a:fontRef idx="minor">
+              <a:schemeClr val="lt1"/>
+            </a:fontRef>
+          </p:style>
+          <p:txBody>
+            <a:bodyPr rtlCol="0" anchor="ctr"/>
+            <a:lstStyle/>
+            <a:p>
+              <a:pPr algn="ctr"/>
+              <a:r>
+                <a:rPr lang="en-US" dirty="0"/>
+                <a:t>el3</a:t>
+              </a:r>
+              <a:endParaRPr lang="ru-UA" dirty="0"/>
+            </a:p>
+          </p:txBody>
+        </p:sp>
+      </p:grpSp>
+      <p:sp>
+        <p:nvSpPr>
+          <p:cNvPr id="6" name="Прямоугольник 5">
+            <a:extLst>
+              <a:ext uri="{FF2B5EF4-FFF2-40B4-BE49-F238E27FC236}">
+                <a16:creationId xmlns:a16="http://schemas.microsoft.com/office/drawing/2014/main" id="{EAB12DF8-C062-4EF4-8784-8D60D8C0B10C}"/>
+              </a:ext>
+            </a:extLst>
+          </p:cNvPr>
+          <p:cNvSpPr/>
+          <p:nvPr/>
+        </p:nvSpPr>
+        <p:spPr>
+          <a:xfrm>
+            <a:off x="1581846" y="300348"/>
+            <a:ext cx="1181377" cy="654096"/>
+          </a:xfrm>
+          <a:prstGeom prst="rect">
+            <a:avLst/>
+          </a:prstGeom>
+        </p:spPr>
+        <p:style>
+          <a:lnRef idx="2">
+            <a:schemeClr val="accent3">
+              <a:shade val="50000"/>
+            </a:schemeClr>
+          </a:lnRef>
+          <a:fillRef idx="1">
+            <a:schemeClr val="accent3"/>
+          </a:fillRef>
+          <a:effectRef idx="0">
+            <a:schemeClr val="accent3"/>
+          </a:effectRef>
+          <a:fontRef idx="minor">
+            <a:schemeClr val="lt1"/>
+          </a:fontRef>
+        </p:style>
+        <p:txBody>
+          <a:bodyPr rtlCol="0" anchor="ctr"/>
+          <a:lstStyle/>
+          <a:p>
+            <a:pPr algn="ctr"/>
+            <a:r>
+              <a:rPr lang="en-US" dirty="0"/>
+              <a:t>el1</a:t>
+            </a:r>
+            <a:endParaRPr lang="ru-UA" dirty="0"/>
+          </a:p>
+        </p:txBody>
+      </p:sp>
+    </p:spTree>
+    <p:extLst>
+      <p:ext uri="{BB962C8B-B14F-4D97-AF65-F5344CB8AC3E}">
+        <p14:creationId xmlns:p14="http://schemas.microsoft.com/office/powerpoint/2010/main" val="2810941317"/>
+      </p:ext>
+    </p:extLst>
+  </p:cSld>
+  <p:clrMapOvr>
+    <a:masterClrMapping/>
+  </p:clrMapOvr>
+</p:sld>
+</file>
+
 <file path=ppt/theme/theme1.xml><?xml version="1.0" encoding="utf-8"?>
 <a:theme xmlns:a="http://schemas.openxmlformats.org/drawingml/2006/main" name="Office Theme">
   <a:themeElements>

</xml_diff>

<commit_message>
ISS-14: Add picture image change API
</commit_message>
<xml_diff>
--- a/test/PptxXML.Tests/Resource/009.pptx
+++ b/test/PptxXML.Tests/Resource/009.pptx
@@ -3765,6 +3765,42 @@
           </a:p>
         </p:txBody>
       </p:sp>
+      <p:pic>
+        <p:nvPicPr>
+          <p:cNvPr id="3" name="Рисунок 2">
+            <a:extLst>
+              <a:ext uri="{FF2B5EF4-FFF2-40B4-BE49-F238E27FC236}">
+                <a16:creationId xmlns:a16="http://schemas.microsoft.com/office/drawing/2014/main" id="{013A7655-AB5F-486A-8FDC-CED46BE93F4A}"/>
+              </a:ext>
+            </a:extLst>
+          </p:cNvPr>
+          <p:cNvPicPr>
+            <a:picLocks noChangeAspect="1"/>
+          </p:cNvPicPr>
+          <p:nvPr/>
+        </p:nvPicPr>
+        <p:blipFill>
+          <a:blip r:embed="rId2">
+            <a:extLst>
+              <a:ext uri="{28A0092B-C50C-407E-A947-70E740481C1C}">
+                <a14:useLocalDpi xmlns:a14="http://schemas.microsoft.com/office/drawing/2010/main" val="0"/>
+              </a:ext>
+            </a:extLst>
+          </a:blip>
+          <a:stretch>
+            <a:fillRect/>
+          </a:stretch>
+        </p:blipFill>
+        <p:spPr>
+          <a:xfrm>
+            <a:off x="3125410" y="178900"/>
+            <a:ext cx="2071697" cy="2071697"/>
+          </a:xfrm>
+          <a:prstGeom prst="rect">
+            <a:avLst/>
+          </a:prstGeom>
+        </p:spPr>
+      </p:pic>
     </p:spTree>
     <p:extLst>
       <p:ext uri="{BB962C8B-B14F-4D97-AF65-F5344CB8AC3E}">

</xml_diff>

<commit_message>
ISS-15: Divide PictureEx element into PictureEx and ShapeEx
</commit_message>
<xml_diff>
--- a/test/PptxXML.Tests/Resource/009.pptx
+++ b/test/PptxXML.Tests/Resource/009.pptx
@@ -7,6 +7,7 @@
   <p:sldIdLst>
     <p:sldId id="256" r:id="rId2"/>
     <p:sldId id="257" r:id="rId3"/>
+    <p:sldId id="258" r:id="rId4"/>
   </p:sldIdLst>
   <p:sldSz cx="9144000" cy="5143500" type="screen16x9"/>
   <p:notesSz cx="7772400" cy="10058400"/>
@@ -3814,6 +3815,95 @@
 </p:sld>
 </file>
 
+<file path=ppt/slides/slide3.xml><?xml version="1.0" encoding="utf-8"?>
+<p:sld xmlns:a="http://schemas.openxmlformats.org/drawingml/2006/main" xmlns:r="http://schemas.openxmlformats.org/officeDocument/2006/relationships" xmlns:p="http://schemas.openxmlformats.org/presentationml/2006/main">
+  <p:cSld>
+    <p:spTree>
+      <p:nvGrpSpPr>
+        <p:cNvPr id="1" name=""/>
+        <p:cNvGrpSpPr/>
+        <p:nvPr/>
+      </p:nvGrpSpPr>
+      <p:grpSpPr>
+        <a:xfrm>
+          <a:off x="0" y="0"/>
+          <a:ext cx="0" cy="0"/>
+          <a:chOff x="0" y="0"/>
+          <a:chExt cx="0" cy="0"/>
+        </a:xfrm>
+      </p:grpSpPr>
+      <p:sp>
+        <p:nvSpPr>
+          <p:cNvPr id="4" name="Прямоугольник 3">
+            <a:extLst>
+              <a:ext uri="{FF2B5EF4-FFF2-40B4-BE49-F238E27FC236}">
+                <a16:creationId xmlns:a16="http://schemas.microsoft.com/office/drawing/2014/main" id="{B0A062B7-AE2E-4414-88A5-F984EDC2405D}"/>
+              </a:ext>
+            </a:extLst>
+          </p:cNvPr>
+          <p:cNvSpPr/>
+          <p:nvPr/>
+        </p:nvSpPr>
+        <p:spPr>
+          <a:xfrm>
+            <a:off x="620724" y="440514"/>
+            <a:ext cx="2436176" cy="1021191"/>
+          </a:xfrm>
+          <a:prstGeom prst="rect">
+            <a:avLst/>
+          </a:prstGeom>
+          <a:blipFill dpi="0" rotWithShape="1">
+            <a:blip r:embed="rId2">
+              <a:extLst>
+                <a:ext uri="{28A0092B-C50C-407E-A947-70E740481C1C}">
+                  <a14:useLocalDpi xmlns:a14="http://schemas.microsoft.com/office/drawing/2010/main" val="0"/>
+                </a:ext>
+              </a:extLst>
+            </a:blip>
+            <a:srcRect/>
+            <a:stretch>
+              <a:fillRect/>
+            </a:stretch>
+          </a:blipFill>
+        </p:spPr>
+        <p:style>
+          <a:lnRef idx="2">
+            <a:schemeClr val="accent1">
+              <a:shade val="50000"/>
+            </a:schemeClr>
+          </a:lnRef>
+          <a:fillRef idx="1">
+            <a:schemeClr val="accent1"/>
+          </a:fillRef>
+          <a:effectRef idx="0">
+            <a:schemeClr val="accent1"/>
+          </a:effectRef>
+          <a:fontRef idx="minor">
+            <a:schemeClr val="lt1"/>
+          </a:fontRef>
+        </p:style>
+        <p:txBody>
+          <a:bodyPr rtlCol="0" anchor="ctr"/>
+          <a:lstStyle/>
+          <a:p>
+            <a:pPr algn="ctr"/>
+            <a:endParaRPr lang="ru-UA" dirty="0"/>
+          </a:p>
+        </p:txBody>
+      </p:sp>
+    </p:spTree>
+    <p:extLst>
+      <p:ext uri="{BB962C8B-B14F-4D97-AF65-F5344CB8AC3E}">
+        <p14:creationId xmlns:p14="http://schemas.microsoft.com/office/powerpoint/2010/main" val="2579714416"/>
+      </p:ext>
+    </p:extLst>
+  </p:cSld>
+  <p:clrMapOvr>
+    <a:masterClrMapping/>
+  </p:clrMapOvr>
+</p:sld>
+</file>
+
 <file path=ppt/theme/theme1.xml><?xml version="1.0" encoding="utf-8"?>
 <a:theme xmlns:a="http://schemas.openxmlformats.org/drawingml/2006/main" name="Office Theme">
   <a:themeElements>

</xml_diff>

<commit_message>
ISS-10: Add API to parse OLE object on a slide
</commit_message>
<xml_diff>
--- a/test/PptxXML.Tests/Resource/009.pptx
+++ b/test/PptxXML.Tests/Resource/009.pptx
@@ -3781,7 +3781,7 @@
           <p:nvPr/>
         </p:nvPicPr>
         <p:blipFill>
-          <a:blip r:embed="rId2">
+          <a:blip r:embed="rId3">
             <a:extLst>
               <a:ext uri="{28A0092B-C50C-407E-A947-70E740481C1C}">
                 <a14:useLocalDpi xmlns:a14="http://schemas.microsoft.com/office/drawing/2010/main" val="0"/>
@@ -3802,6 +3802,180 @@
           </a:prstGeom>
         </p:spPr>
       </p:pic>
+      <p:graphicFrame>
+        <p:nvGraphicFramePr>
+          <p:cNvPr id="8" name="Object 2">
+            <a:extLst>
+              <a:ext uri="{FF2B5EF4-FFF2-40B4-BE49-F238E27FC236}">
+                <a16:creationId xmlns:a16="http://schemas.microsoft.com/office/drawing/2014/main" id="{489DF85C-829D-4D30-980E-2BABEAB680A8}"/>
+              </a:ext>
+            </a:extLst>
+          </p:cNvPr>
+          <p:cNvGraphicFramePr>
+            <a:graphicFrameLocks noChangeAspect="1"/>
+          </p:cNvGraphicFramePr>
+          <p:nvPr>
+            <p:extLst>
+              <p:ext uri="{D42A27DB-BD31-4B8C-83A1-F6EECF244321}">
+                <p14:modId xmlns:p14="http://schemas.microsoft.com/office/powerpoint/2010/main" val="3370864875"/>
+              </p:ext>
+            </p:extLst>
+          </p:nvPr>
+        </p:nvGraphicFramePr>
+        <p:xfrm>
+          <a:off x="784248" y="4209355"/>
+          <a:ext cx="5940425" cy="323850"/>
+        </p:xfrm>
+        <a:graphic>
+          <a:graphicData uri="http://schemas.openxmlformats.org/presentationml/2006/ole">
+            <mc:AlternateContent xmlns:mc="http://schemas.openxmlformats.org/markup-compatibility/2006">
+              <mc:Choice xmlns:v="urn:schemas-microsoft-com:vml" Requires="v">
+                <p:oleObj spid="_x0000_s1026" name="Document" r:id="rId4" imgW="5940848" imgH="323743" progId="Word.Document.12">
+                  <p:embed/>
+                </p:oleObj>
+              </mc:Choice>
+              <mc:Fallback>
+                <p:oleObj name="Document" r:id="rId4" imgW="5940848" imgH="323743" progId="Word.Document.12">
+                  <p:embed/>
+                  <p:pic>
+                    <p:nvPicPr>
+                      <p:cNvPr id="1026" name="Object 2"/>
+                      <p:cNvPicPr>
+                        <a:picLocks noChangeAspect="1" noChangeArrowheads="1"/>
+                      </p:cNvPicPr>
+                      <p:nvPr/>
+                    </p:nvPicPr>
+                    <p:blipFill>
+                      <a:blip r:embed="rId5">
+                        <a:extLst>
+                          <a:ext uri="{28A0092B-C50C-407E-A947-70E740481C1C}">
+                            <a14:useLocalDpi xmlns:a14="http://schemas.microsoft.com/office/drawing/2010/main" val="0"/>
+                          </a:ext>
+                        </a:extLst>
+                      </a:blip>
+                      <a:srcRect/>
+                      <a:stretch>
+                        <a:fillRect/>
+                      </a:stretch>
+                    </p:blipFill>
+                    <p:spPr bwMode="auto">
+                      <a:xfrm>
+                        <a:off x="784248" y="4209355"/>
+                        <a:ext cx="5940425" cy="323850"/>
+                      </a:xfrm>
+                      <a:prstGeom prst="rect">
+                        <a:avLst/>
+                      </a:prstGeom>
+                      <a:noFill/>
+                      <a:ln>
+                        <a:noFill/>
+                      </a:ln>
+                      <a:effectLst/>
+                      <a:extLst>
+                        <a:ext uri="{909E8E84-426E-40DD-AFC4-6F175D3DCCD1}">
+                          <a14:hiddenFill xmlns:a14="http://schemas.microsoft.com/office/drawing/2010/main">
+                            <a:solidFill>
+                              <a:schemeClr val="accent1"/>
+                            </a:solidFill>
+                          </a14:hiddenFill>
+                        </a:ext>
+                        <a:ext uri="{91240B29-F687-4F45-9708-019B960494DF}">
+                          <a14:hiddenLine xmlns:a14="http://schemas.microsoft.com/office/drawing/2010/main" w="9525">
+                            <a:solidFill>
+                              <a:schemeClr val="tx1"/>
+                            </a:solidFill>
+                            <a:miter lim="800000"/>
+                            <a:headEnd/>
+                            <a:tailEnd/>
+                          </a14:hiddenLine>
+                        </a:ext>
+                        <a:ext uri="{AF507438-7753-43E0-B8FC-AC1667EBCBE1}">
+                          <a14:hiddenEffects xmlns:a14="http://schemas.microsoft.com/office/drawing/2010/main">
+                            <a:effectLst>
+                              <a:outerShdw dist="35921" dir="2700000" algn="ctr" rotWithShape="0">
+                                <a:schemeClr val="bg2"/>
+                              </a:outerShdw>
+                            </a:effectLst>
+                          </a14:hiddenEffects>
+                        </a:ext>
+                      </a:extLst>
+                    </p:spPr>
+                  </p:pic>
+                </p:oleObj>
+              </mc:Fallback>
+            </mc:AlternateContent>
+          </a:graphicData>
+        </a:graphic>
+      </p:graphicFrame>
+      <p:graphicFrame>
+        <p:nvGraphicFramePr>
+          <p:cNvPr id="9" name="Object 3">
+            <a:extLst>
+              <a:ext uri="{FF2B5EF4-FFF2-40B4-BE49-F238E27FC236}">
+                <a16:creationId xmlns:a16="http://schemas.microsoft.com/office/drawing/2014/main" id="{09350A99-A357-406E-8F0C-80DC44DB5A58}"/>
+              </a:ext>
+            </a:extLst>
+          </p:cNvPr>
+          <p:cNvGraphicFramePr>
+            <a:graphicFrameLocks noChangeAspect="1"/>
+          </p:cNvGraphicFramePr>
+          <p:nvPr>
+            <p:extLst>
+              <p:ext uri="{D42A27DB-BD31-4B8C-83A1-F6EECF244321}">
+                <p14:modId xmlns:p14="http://schemas.microsoft.com/office/powerpoint/2010/main" val="835386340"/>
+              </p:ext>
+            </p:extLst>
+          </p:nvPr>
+        </p:nvGraphicFramePr>
+        <p:xfrm>
+          <a:off x="699323" y="3463288"/>
+          <a:ext cx="485775" cy="373062"/>
+        </p:xfrm>
+        <a:graphic>
+          <a:graphicData uri="http://schemas.openxmlformats.org/presentationml/2006/ole">
+            <mc:AlternateContent xmlns:mc="http://schemas.openxmlformats.org/markup-compatibility/2006">
+              <mc:Choice xmlns:v="urn:schemas-microsoft-com:vml" Requires="v">
+                <p:oleObj spid="_x0000_s1027" name="Packager Shell Object" showAsIcon="1" r:id="rId6" imgW="485640" imgH="372960" progId="Package">
+                  <p:embed/>
+                </p:oleObj>
+              </mc:Choice>
+              <mc:Fallback>
+                <p:oleObj name="Packager Shell Object" showAsIcon="1" r:id="rId6" imgW="485640" imgH="372960" progId="Package">
+                  <p:embed/>
+                  <p:pic>
+                    <p:nvPicPr>
+                      <p:cNvPr id="4" name="Object 3">
+                        <a:extLst>
+                          <a:ext uri="{FF2B5EF4-FFF2-40B4-BE49-F238E27FC236}">
+                            <a16:creationId xmlns:a16="http://schemas.microsoft.com/office/drawing/2014/main" id="{F142D850-C403-4EDF-93CE-7999EE09D765}"/>
+                          </a:ext>
+                        </a:extLst>
+                      </p:cNvPr>
+                      <p:cNvPicPr/>
+                      <p:nvPr/>
+                    </p:nvPicPr>
+                    <p:blipFill>
+                      <a:blip r:embed="rId7"/>
+                      <a:stretch>
+                        <a:fillRect/>
+                      </a:stretch>
+                    </p:blipFill>
+                    <p:spPr>
+                      <a:xfrm>
+                        <a:off x="699323" y="3463288"/>
+                        <a:ext cx="485775" cy="373062"/>
+                      </a:xfrm>
+                      <a:prstGeom prst="rect">
+                        <a:avLst/>
+                      </a:prstGeom>
+                    </p:spPr>
+                  </p:pic>
+                </p:oleObj>
+              </mc:Fallback>
+            </mc:AlternateContent>
+          </a:graphicData>
+        </a:graphic>
+      </p:graphicFrame>
     </p:spTree>
     <p:extLst>
       <p:ext uri="{BB962C8B-B14F-4D97-AF65-F5344CB8AC3E}">

</xml_diff>

<commit_message>
ISS-19: Add API to change slide background image
</commit_message>
<xml_diff>
--- a/test/PptxXML.Tests/Resource/009.pptx
+++ b/test/PptxXML.Tests/Resource/009.pptx
@@ -2870,6 +2870,20 @@
 <file path=ppt/slides/slide1.xml><?xml version="1.0" encoding="utf-8"?>
 <p:sld xmlns:a="http://schemas.openxmlformats.org/drawingml/2006/main" xmlns:r="http://schemas.openxmlformats.org/officeDocument/2006/relationships" xmlns:p="http://schemas.openxmlformats.org/presentationml/2006/main">
   <p:cSld>
+    <p:bg>
+      <p:bgPr>
+        <a:blipFill dpi="0" rotWithShape="1">
+          <a:blip r:embed="rId2">
+            <a:lum/>
+          </a:blip>
+          <a:srcRect/>
+          <a:stretch>
+            <a:fillRect/>
+          </a:stretch>
+        </a:blipFill>
+        <a:effectLst/>
+      </p:bgPr>
+    </p:bg>
     <p:spTree>
       <p:nvGrpSpPr>
         <p:cNvPr id="1" name=""/>
@@ -2928,7 +2942,7 @@
           <p:nvPr/>
         </p:nvPicPr>
         <p:blipFill>
-          <a:blip r:embed="rId2"/>
+          <a:blip r:embed="rId3"/>
           <a:stretch/>
         </p:blipFill>
         <p:spPr>
@@ -3377,7 +3391,7 @@
         </p:xfrm>
         <a:graphic>
           <a:graphicData uri="http://schemas.openxmlformats.org/drawingml/2006/chart">
-            <c:chart xmlns:c="http://schemas.openxmlformats.org/drawingml/2006/chart" xmlns:r="http://schemas.openxmlformats.org/officeDocument/2006/relationships" r:id="rId3"/>
+            <c:chart xmlns:c="http://schemas.openxmlformats.org/drawingml/2006/chart" xmlns:r="http://schemas.openxmlformats.org/officeDocument/2006/relationships" r:id="rId4"/>
           </a:graphicData>
         </a:graphic>
       </p:graphicFrame>
@@ -3830,7 +3844,7 @@
           <a:graphicData uri="http://schemas.openxmlformats.org/presentationml/2006/ole">
             <mc:AlternateContent xmlns:mc="http://schemas.openxmlformats.org/markup-compatibility/2006">
               <mc:Choice xmlns:v="urn:schemas-microsoft-com:vml" Requires="v">
-                <p:oleObj spid="_x0000_s1026" name="Document" r:id="rId4" imgW="5940848" imgH="323743" progId="Word.Document.12">
+                <p:oleObj spid="_x0000_s1028" name="Document" r:id="rId4" imgW="5940848" imgH="323743" progId="Word.Document.12">
                   <p:embed/>
                 </p:oleObj>
               </mc:Choice>
@@ -3935,7 +3949,7 @@
           <a:graphicData uri="http://schemas.openxmlformats.org/presentationml/2006/ole">
             <mc:AlternateContent xmlns:mc="http://schemas.openxmlformats.org/markup-compatibility/2006">
               <mc:Choice xmlns:v="urn:schemas-microsoft-com:vml" Requires="v">
-                <p:oleObj spid="_x0000_s1027" name="Packager Shell Object" showAsIcon="1" r:id="rId6" imgW="485640" imgH="372960" progId="Package">
+                <p:oleObj spid="_x0000_s1029" name="Packager Shell Object" showAsIcon="1" r:id="rId6" imgW="485640" imgH="372960" progId="Package">
                   <p:embed/>
                 </p:oleObj>
               </mc:Choice>

</xml_diff>

<commit_message>
ISS-18: Add base API to read font height
</commit_message>
<xml_diff>
--- a/test/PptxXML.Tests/Resource/009.pptx
+++ b/test/PptxXML.Tests/Resource/009.pptx
@@ -8,6 +8,7 @@
     <p:sldId id="256" r:id="rId2"/>
     <p:sldId id="257" r:id="rId3"/>
     <p:sldId id="258" r:id="rId4"/>
+    <p:sldId id="259" r:id="rId5"/>
   </p:sldIdLst>
   <p:sldSz cx="9144000" cy="5143500" type="screen16x9"/>
   <p:notesSz cx="7772400" cy="10058400"/>
@@ -1725,7 +1726,7 @@
           <a:lstStyle/>
           <a:p>
             <a:pPr algn="ctr"/>
-            <a:endParaRPr lang="en-US" sz="4400" b="0" strike="noStrike" spc="-1">
+            <a:endParaRPr lang="en-US" sz="4400" b="0" strike="noStrike" spc="-1" dirty="0">
               <a:latin typeface="Arial"/>
             </a:endParaRPr>
           </a:p>
@@ -1757,7 +1758,7 @@
           <a:lstStyle/>
           <a:p>
             <a:pPr algn="ctr"/>
-            <a:endParaRPr lang="en-US" sz="3200" b="0" strike="noStrike" spc="-1">
+            <a:endParaRPr lang="en-US" sz="3200" b="0" strike="noStrike" spc="-1" dirty="0">
               <a:latin typeface="Arial"/>
             </a:endParaRPr>
           </a:p>
@@ -3844,7 +3845,7 @@
           <a:graphicData uri="http://schemas.openxmlformats.org/presentationml/2006/ole">
             <mc:AlternateContent xmlns:mc="http://schemas.openxmlformats.org/markup-compatibility/2006">
               <mc:Choice xmlns:v="urn:schemas-microsoft-com:vml" Requires="v">
-                <p:oleObj spid="_x0000_s1028" name="Document" r:id="rId4" imgW="5940848" imgH="323743" progId="Word.Document.12">
+                <p:oleObj spid="_x0000_s1060" name="Document" r:id="rId4" imgW="5940848" imgH="323743" progId="Word.Document.12">
                   <p:embed/>
                 </p:oleObj>
               </mc:Choice>
@@ -3949,7 +3950,7 @@
           <a:graphicData uri="http://schemas.openxmlformats.org/presentationml/2006/ole">
             <mc:AlternateContent xmlns:mc="http://schemas.openxmlformats.org/markup-compatibility/2006">
               <mc:Choice xmlns:v="urn:schemas-microsoft-com:vml" Requires="v">
-                <p:oleObj spid="_x0000_s1029" name="Packager Shell Object" showAsIcon="1" r:id="rId6" imgW="485640" imgH="372960" progId="Package">
+                <p:oleObj spid="_x0000_s1061" name="Packager Shell Object" showAsIcon="1" r:id="rId6" imgW="485640" imgH="372960" progId="Package">
                   <p:embed/>
                 </p:oleObj>
               </mc:Choice>
@@ -4079,10 +4080,161 @@
           </a:p>
         </p:txBody>
       </p:sp>
+      <p:sp>
+        <p:nvSpPr>
+          <p:cNvPr id="2" name="Прямоугольник 1">
+            <a:extLst>
+              <a:ext uri="{FF2B5EF4-FFF2-40B4-BE49-F238E27FC236}">
+                <a16:creationId xmlns:a16="http://schemas.microsoft.com/office/drawing/2014/main" id="{CF32E4CA-9360-404D-A59E-EC22F588779B}"/>
+              </a:ext>
+            </a:extLst>
+          </p:cNvPr>
+          <p:cNvSpPr/>
+          <p:nvPr/>
+        </p:nvSpPr>
+        <p:spPr>
+          <a:xfrm>
+            <a:off x="727515" y="1882196"/>
+            <a:ext cx="2282663" cy="567328"/>
+          </a:xfrm>
+          <a:prstGeom prst="rect">
+            <a:avLst/>
+          </a:prstGeom>
+        </p:spPr>
+        <p:style>
+          <a:lnRef idx="2">
+            <a:schemeClr val="accent5">
+              <a:shade val="50000"/>
+            </a:schemeClr>
+          </a:lnRef>
+          <a:fillRef idx="1">
+            <a:schemeClr val="accent5"/>
+          </a:fillRef>
+          <a:effectRef idx="0">
+            <a:schemeClr val="accent5"/>
+          </a:effectRef>
+          <a:fontRef idx="minor">
+            <a:schemeClr val="lt1"/>
+          </a:fontRef>
+        </p:style>
+        <p:txBody>
+          <a:bodyPr rtlCol="0" anchor="ctr"/>
+          <a:lstStyle/>
+          <a:p>
+            <a:r>
+              <a:rPr lang="en-US" dirty="0"/>
+              <a:t>Ph1pn1 </a:t>
+            </a:r>
+            <a:r>
+              <a:rPr lang="en-US" sz="2000" dirty="0" err="1"/>
+              <a:t>ph1pn1</a:t>
+            </a:r>
+            <a:endParaRPr lang="ru-UA" sz="2000" dirty="0"/>
+          </a:p>
+        </p:txBody>
+      </p:sp>
     </p:spTree>
     <p:extLst>
       <p:ext uri="{BB962C8B-B14F-4D97-AF65-F5344CB8AC3E}">
         <p14:creationId xmlns:p14="http://schemas.microsoft.com/office/powerpoint/2010/main" val="2579714416"/>
+      </p:ext>
+    </p:extLst>
+  </p:cSld>
+  <p:clrMapOvr>
+    <a:masterClrMapping/>
+  </p:clrMapOvr>
+</p:sld>
+</file>
+
+<file path=ppt/slides/slide4.xml><?xml version="1.0" encoding="utf-8"?>
+<p:sld xmlns:a="http://schemas.openxmlformats.org/drawingml/2006/main" xmlns:r="http://schemas.openxmlformats.org/officeDocument/2006/relationships" xmlns:p="http://schemas.openxmlformats.org/presentationml/2006/main">
+  <p:cSld>
+    <p:spTree>
+      <p:nvGrpSpPr>
+        <p:cNvPr id="1" name=""/>
+        <p:cNvGrpSpPr/>
+        <p:nvPr/>
+      </p:nvGrpSpPr>
+      <p:grpSpPr>
+        <a:xfrm>
+          <a:off x="0" y="0"/>
+          <a:ext cx="0" cy="0"/>
+          <a:chOff x="0" y="0"/>
+          <a:chExt cx="0" cy="0"/>
+        </a:xfrm>
+      </p:grpSpPr>
+      <p:sp>
+        <p:nvSpPr>
+          <p:cNvPr id="2" name="Заголовок 1">
+            <a:extLst>
+              <a:ext uri="{FF2B5EF4-FFF2-40B4-BE49-F238E27FC236}">
+                <a16:creationId xmlns:a16="http://schemas.microsoft.com/office/drawing/2014/main" id="{96D6FC7B-CB86-44D7-B3A4-0F033865791C}"/>
+              </a:ext>
+            </a:extLst>
+          </p:cNvPr>
+          <p:cNvSpPr>
+            <a:spLocks noGrp="1"/>
+          </p:cNvSpPr>
+          <p:nvPr>
+            <p:ph type="title"/>
+          </p:nvPr>
+        </p:nvSpPr>
+        <p:spPr>
+          <a:xfrm>
+            <a:off x="457200" y="329801"/>
+            <a:ext cx="8229240" cy="609398"/>
+          </a:xfrm>
+        </p:spPr>
+        <p:txBody>
+          <a:bodyPr/>
+          <a:lstStyle/>
+          <a:p>
+            <a:r>
+              <a:rPr lang="en-US" dirty="0"/>
+              <a:t>Title text</a:t>
+            </a:r>
+            <a:endParaRPr lang="ru-UA" dirty="0"/>
+          </a:p>
+        </p:txBody>
+      </p:sp>
+      <p:sp>
+        <p:nvSpPr>
+          <p:cNvPr id="3" name="Подзаголовок 2">
+            <a:extLst>
+              <a:ext uri="{FF2B5EF4-FFF2-40B4-BE49-F238E27FC236}">
+                <a16:creationId xmlns:a16="http://schemas.microsoft.com/office/drawing/2014/main" id="{184891BC-8568-4A6B-AB4A-15B07ACF7480}"/>
+              </a:ext>
+            </a:extLst>
+          </p:cNvPr>
+          <p:cNvSpPr>
+            <a:spLocks noGrp="1"/>
+          </p:cNvSpPr>
+          <p:nvPr>
+            <p:ph type="subTitle"/>
+          </p:nvPr>
+        </p:nvSpPr>
+        <p:spPr>
+          <a:xfrm>
+            <a:off x="457200" y="2501061"/>
+            <a:ext cx="8229240" cy="387798"/>
+          </a:xfrm>
+        </p:spPr>
+        <p:txBody>
+          <a:bodyPr/>
+          <a:lstStyle/>
+          <a:p>
+            <a:r>
+              <a:rPr lang="en-US" dirty="0"/>
+              <a:t>Subtitle text</a:t>
+            </a:r>
+            <a:endParaRPr lang="ru-UA" dirty="0"/>
+          </a:p>
+        </p:txBody>
+      </p:sp>
+    </p:spTree>
+    <p:extLst>
+      <p:ext uri="{BB962C8B-B14F-4D97-AF65-F5344CB8AC3E}">
+        <p14:creationId xmlns:p14="http://schemas.microsoft.com/office/powerpoint/2010/main" val="3518446693"/>
       </p:ext>
     </p:extLst>
   </p:cSld>

</xml_diff>

<commit_message>
ISS-17: add base APIs for cell, column and row
</commit_message>
<xml_diff>
--- a/test/PptxXML.Tests/Resource/009.pptx
+++ b/test/PptxXML.Tests/Resource/009.pptx
@@ -3845,7 +3845,7 @@
           <a:graphicData uri="http://schemas.openxmlformats.org/presentationml/2006/ole">
             <mc:AlternateContent xmlns:mc="http://schemas.openxmlformats.org/markup-compatibility/2006">
               <mc:Choice xmlns:v="urn:schemas-microsoft-com:vml" Requires="v">
-                <p:oleObj spid="_x0000_s1060" name="Document" r:id="rId4" imgW="5940848" imgH="323743" progId="Word.Document.12">
+                <p:oleObj spid="_x0000_s1064" name="Document" r:id="rId4" imgW="5940848" imgH="323743" progId="Word.Document.12">
                   <p:embed/>
                 </p:oleObj>
               </mc:Choice>
@@ -3950,7 +3950,7 @@
           <a:graphicData uri="http://schemas.openxmlformats.org/presentationml/2006/ole">
             <mc:AlternateContent xmlns:mc="http://schemas.openxmlformats.org/markup-compatibility/2006">
               <mc:Choice xmlns:v="urn:schemas-microsoft-com:vml" Requires="v">
-                <p:oleObj spid="_x0000_s1061" name="Packager Shell Object" showAsIcon="1" r:id="rId6" imgW="485640" imgH="372960" progId="Package">
+                <p:oleObj spid="_x0000_s1065" name="Packager Shell Object" showAsIcon="1" r:id="rId6" imgW="485640" imgH="372960" progId="Package">
                   <p:embed/>
                 </p:oleObj>
               </mc:Choice>
@@ -4133,6 +4133,204 @@
           </a:p>
         </p:txBody>
       </p:sp>
+      <p:graphicFrame>
+        <p:nvGraphicFramePr>
+          <p:cNvPr id="3" name="Таблица 4">
+            <a:extLst>
+              <a:ext uri="{FF2B5EF4-FFF2-40B4-BE49-F238E27FC236}">
+                <a16:creationId xmlns:a16="http://schemas.microsoft.com/office/drawing/2014/main" id="{2C6A51E3-796B-4DCF-964E-84762255507D}"/>
+              </a:ext>
+            </a:extLst>
+          </p:cNvPr>
+          <p:cNvGraphicFramePr>
+            <a:graphicFrameLocks noGrp="1"/>
+          </p:cNvGraphicFramePr>
+          <p:nvPr>
+            <p:extLst>
+              <p:ext uri="{D42A27DB-BD31-4B8C-83A1-F6EECF244321}">
+                <p14:modId xmlns:p14="http://schemas.microsoft.com/office/powerpoint/2010/main" val="1162558607"/>
+              </p:ext>
+            </p:extLst>
+          </p:nvPr>
+        </p:nvGraphicFramePr>
+        <p:xfrm>
+          <a:off x="3159241" y="394849"/>
+          <a:ext cx="5597640" cy="1645920"/>
+        </p:xfrm>
+        <a:graphic>
+          <a:graphicData uri="http://schemas.openxmlformats.org/drawingml/2006/table">
+            <a:tbl>
+              <a:tblPr firstRow="1" bandRow="1">
+                <a:tableStyleId>{5C22544A-7EE6-4342-B048-85BDC9FD1C3A}</a:tableStyleId>
+              </a:tblPr>
+              <a:tblGrid>
+                <a:gridCol w="1865880">
+                  <a:extLst>
+                    <a:ext uri="{9D8B030D-6E8A-4147-A177-3AD203B41FA5}">
+                      <a16:colId xmlns:a16="http://schemas.microsoft.com/office/drawing/2014/main" val="4027382071"/>
+                    </a:ext>
+                  </a:extLst>
+                </a:gridCol>
+                <a:gridCol w="1865880">
+                  <a:extLst>
+                    <a:ext uri="{9D8B030D-6E8A-4147-A177-3AD203B41FA5}">
+                      <a16:colId xmlns:a16="http://schemas.microsoft.com/office/drawing/2014/main" val="2583379656"/>
+                    </a:ext>
+                  </a:extLst>
+                </a:gridCol>
+                <a:gridCol w="1865880">
+                  <a:extLst>
+                    <a:ext uri="{9D8B030D-6E8A-4147-A177-3AD203B41FA5}">
+                      <a16:colId xmlns:a16="http://schemas.microsoft.com/office/drawing/2014/main" val="527433963"/>
+                    </a:ext>
+                  </a:extLst>
+                </a:gridCol>
+              </a:tblGrid>
+              <a:tr h="355619">
+                <a:tc>
+                  <a:txBody>
+                    <a:bodyPr/>
+                    <a:lstStyle/>
+                    <a:p>
+                      <a:pPr marL="285750" indent="-285750">
+                        <a:buFont typeface="Arial" panose="020B0604020202020204" pitchFamily="34" charset="0"/>
+                        <a:buChar char="•"/>
+                      </a:pPr>
+                      <a:r>
+                        <a:rPr lang="en-US" dirty="0"/>
+                        <a:t>0:0_p1_lvl1</a:t>
+                      </a:r>
+                    </a:p>
+                    <a:p>
+                      <a:pPr marL="742950" marR="0" lvl="1" indent="-285750" algn="l" defTabSz="914400" rtl="0" eaLnBrk="1" fontAlgn="auto" latinLnBrk="0" hangingPunct="1">
+                        <a:lnSpc>
+                          <a:spcPct val="100000"/>
+                        </a:lnSpc>
+                        <a:spcBef>
+                          <a:spcPts val="0"/>
+                        </a:spcBef>
+                        <a:spcAft>
+                          <a:spcPts val="0"/>
+                        </a:spcAft>
+                        <a:buClrTx/>
+                        <a:buSzTx/>
+                        <a:buFont typeface="Arial" panose="020B0604020202020204" pitchFamily="34" charset="0"/>
+                        <a:buChar char="•"/>
+                        <a:tabLst/>
+                        <a:defRPr/>
+                      </a:pPr>
+                      <a:r>
+                        <a:rPr lang="en-US" dirty="0"/>
+                        <a:t>0:0_p2_lvl2</a:t>
+                      </a:r>
+                    </a:p>
+                  </a:txBody>
+                  <a:tcPr/>
+                </a:tc>
+                <a:tc>
+                  <a:txBody>
+                    <a:bodyPr/>
+                    <a:lstStyle/>
+                    <a:p>
+                      <a:endParaRPr lang="ru-UA"/>
+                    </a:p>
+                  </a:txBody>
+                  <a:tcPr/>
+                </a:tc>
+                <a:tc>
+                  <a:txBody>
+                    <a:bodyPr/>
+                    <a:lstStyle/>
+                    <a:p>
+                      <a:endParaRPr lang="ru-UA"/>
+                    </a:p>
+                  </a:txBody>
+                  <a:tcPr/>
+                </a:tc>
+                <a:extLst>
+                  <a:ext uri="{0D108BD9-81ED-4DB2-BD59-A6C34878D82A}">
+                    <a16:rowId xmlns:a16="http://schemas.microsoft.com/office/drawing/2014/main" val="2641185649"/>
+                  </a:ext>
+                </a:extLst>
+              </a:tr>
+              <a:tr h="355619">
+                <a:tc>
+                  <a:txBody>
+                    <a:bodyPr/>
+                    <a:lstStyle/>
+                    <a:p>
+                      <a:endParaRPr lang="ru-UA" dirty="0"/>
+                    </a:p>
+                  </a:txBody>
+                  <a:tcPr/>
+                </a:tc>
+                <a:tc>
+                  <a:txBody>
+                    <a:bodyPr/>
+                    <a:lstStyle/>
+                    <a:p>
+                      <a:endParaRPr lang="ru-UA"/>
+                    </a:p>
+                  </a:txBody>
+                  <a:tcPr/>
+                </a:tc>
+                <a:tc>
+                  <a:txBody>
+                    <a:bodyPr/>
+                    <a:lstStyle/>
+                    <a:p>
+                      <a:endParaRPr lang="ru-UA"/>
+                    </a:p>
+                  </a:txBody>
+                  <a:tcPr/>
+                </a:tc>
+                <a:extLst>
+                  <a:ext uri="{0D108BD9-81ED-4DB2-BD59-A6C34878D82A}">
+                    <a16:rowId xmlns:a16="http://schemas.microsoft.com/office/drawing/2014/main" val="516064255"/>
+                  </a:ext>
+                </a:extLst>
+              </a:tr>
+              <a:tr h="355619">
+                <a:tc>
+                  <a:txBody>
+                    <a:bodyPr/>
+                    <a:lstStyle/>
+                    <a:p>
+                      <a:endParaRPr lang="ru-UA"/>
+                    </a:p>
+                  </a:txBody>
+                  <a:tcPr/>
+                </a:tc>
+                <a:tc>
+                  <a:txBody>
+                    <a:bodyPr/>
+                    <a:lstStyle/>
+                    <a:p>
+                      <a:endParaRPr lang="ru-UA"/>
+                    </a:p>
+                  </a:txBody>
+                  <a:tcPr/>
+                </a:tc>
+                <a:tc>
+                  <a:txBody>
+                    <a:bodyPr/>
+                    <a:lstStyle/>
+                    <a:p>
+                      <a:endParaRPr lang="ru-UA" dirty="0"/>
+                    </a:p>
+                  </a:txBody>
+                  <a:tcPr/>
+                </a:tc>
+                <a:extLst>
+                  <a:ext uri="{0D108BD9-81ED-4DB2-BD59-A6C34878D82A}">
+                    <a16:rowId xmlns:a16="http://schemas.microsoft.com/office/drawing/2014/main" val="2147331029"/>
+                  </a:ext>
+                </a:extLst>
+              </a:tr>
+            </a:tbl>
+          </a:graphicData>
+        </a:graphic>
+      </p:graphicFrame>
     </p:spTree>
     <p:extLst>
       <p:ext uri="{BB962C8B-B14F-4D97-AF65-F5344CB8AC3E}">

</xml_diff>